<commit_message>
Updates To threshold code and instructions
</commit_message>
<xml_diff>
--- a/Assets/StreamingAssets/2D_Objects/Practice/Practice_online_final.pptx
+++ b/Assets/StreamingAssets/2D_Objects/Practice/Practice_online_final.pptx
@@ -292,7 +292,7 @@
           <a:p>
             <a:fld id="{CA365A23-D275-4D5C-A163-A5AA11A9E6CE}" type="datetimeFigureOut">
               <a:rPr lang="en-US" smtClean="0"/>
-              <a:t>5/9/2020</a:t>
+              <a:t>5/28/2020</a:t>
             </a:fld>
             <a:endParaRPr lang="en-US"/>
           </a:p>
@@ -490,7 +490,7 @@
           <a:p>
             <a:fld id="{CA365A23-D275-4D5C-A163-A5AA11A9E6CE}" type="datetimeFigureOut">
               <a:rPr lang="en-US" smtClean="0"/>
-              <a:t>5/9/2020</a:t>
+              <a:t>5/28/2020</a:t>
             </a:fld>
             <a:endParaRPr lang="en-US"/>
           </a:p>
@@ -698,7 +698,7 @@
           <a:p>
             <a:fld id="{CA365A23-D275-4D5C-A163-A5AA11A9E6CE}" type="datetimeFigureOut">
               <a:rPr lang="en-US" smtClean="0"/>
-              <a:t>5/9/2020</a:t>
+              <a:t>5/28/2020</a:t>
             </a:fld>
             <a:endParaRPr lang="en-US"/>
           </a:p>
@@ -896,7 +896,7 @@
           <a:p>
             <a:fld id="{CA365A23-D275-4D5C-A163-A5AA11A9E6CE}" type="datetimeFigureOut">
               <a:rPr lang="en-US" smtClean="0"/>
-              <a:t>5/9/2020</a:t>
+              <a:t>5/28/2020</a:t>
             </a:fld>
             <a:endParaRPr lang="en-US"/>
           </a:p>
@@ -1171,7 +1171,7 @@
           <a:p>
             <a:fld id="{CA365A23-D275-4D5C-A163-A5AA11A9E6CE}" type="datetimeFigureOut">
               <a:rPr lang="en-US" smtClean="0"/>
-              <a:t>5/9/2020</a:t>
+              <a:t>5/28/2020</a:t>
             </a:fld>
             <a:endParaRPr lang="en-US"/>
           </a:p>
@@ -1436,7 +1436,7 @@
           <a:p>
             <a:fld id="{CA365A23-D275-4D5C-A163-A5AA11A9E6CE}" type="datetimeFigureOut">
               <a:rPr lang="en-US" smtClean="0"/>
-              <a:t>5/9/2020</a:t>
+              <a:t>5/28/2020</a:t>
             </a:fld>
             <a:endParaRPr lang="en-US"/>
           </a:p>
@@ -1848,7 +1848,7 @@
           <a:p>
             <a:fld id="{CA365A23-D275-4D5C-A163-A5AA11A9E6CE}" type="datetimeFigureOut">
               <a:rPr lang="en-US" smtClean="0"/>
-              <a:t>5/9/2020</a:t>
+              <a:t>5/28/2020</a:t>
             </a:fld>
             <a:endParaRPr lang="en-US"/>
           </a:p>
@@ -1989,7 +1989,7 @@
           <a:p>
             <a:fld id="{CA365A23-D275-4D5C-A163-A5AA11A9E6CE}" type="datetimeFigureOut">
               <a:rPr lang="en-US" smtClean="0"/>
-              <a:t>5/9/2020</a:t>
+              <a:t>5/28/2020</a:t>
             </a:fld>
             <a:endParaRPr lang="en-US"/>
           </a:p>
@@ -2102,7 +2102,7 @@
           <a:p>
             <a:fld id="{CA365A23-D275-4D5C-A163-A5AA11A9E6CE}" type="datetimeFigureOut">
               <a:rPr lang="en-US" smtClean="0"/>
-              <a:t>5/9/2020</a:t>
+              <a:t>5/28/2020</a:t>
             </a:fld>
             <a:endParaRPr lang="en-US"/>
           </a:p>
@@ -2413,7 +2413,7 @@
           <a:p>
             <a:fld id="{CA365A23-D275-4D5C-A163-A5AA11A9E6CE}" type="datetimeFigureOut">
               <a:rPr lang="en-US" smtClean="0"/>
-              <a:t>5/9/2020</a:t>
+              <a:t>5/28/2020</a:t>
             </a:fld>
             <a:endParaRPr lang="en-US"/>
           </a:p>
@@ -2701,7 +2701,7 @@
           <a:p>
             <a:fld id="{CA365A23-D275-4D5C-A163-A5AA11A9E6CE}" type="datetimeFigureOut">
               <a:rPr lang="en-US" smtClean="0"/>
-              <a:t>5/9/2020</a:t>
+              <a:t>5/28/2020</a:t>
             </a:fld>
             <a:endParaRPr lang="en-US"/>
           </a:p>
@@ -2942,7 +2942,7 @@
           <a:p>
             <a:fld id="{CA365A23-D275-4D5C-A163-A5AA11A9E6CE}" type="datetimeFigureOut">
               <a:rPr lang="en-US" smtClean="0"/>
-              <a:t>5/9/2020</a:t>
+              <a:t>5/28/2020</a:t>
             </a:fld>
             <a:endParaRPr lang="en-US"/>
           </a:p>
@@ -3622,8 +3622,8 @@
         </p:nvSpPr>
         <p:spPr>
           <a:xfrm>
-            <a:off x="71015" y="107900"/>
-            <a:ext cx="12027877" cy="3233254"/>
+            <a:off x="82061" y="598747"/>
+            <a:ext cx="12027877" cy="1241929"/>
           </a:xfrm>
         </p:spPr>
         <p:txBody>
@@ -3636,21 +3636,16 @@
               <a:buNone/>
             </a:pPr>
             <a:r>
-              <a:rPr lang="en-US" sz="6000" b="1" dirty="0"/>
-              <a:t>PRACTICE: </a:t>
-            </a:r>
-            <a:r>
-              <a:rPr lang="en-US" sz="6000" dirty="0"/>
-              <a:t>FINDING MONEY</a:t>
-            </a:r>
-          </a:p>
-          <a:p>
-            <a:pPr marL="0" indent="0" algn="ctr">
-              <a:buNone/>
-            </a:pPr>
-            <a:r>
               <a:rPr lang="en-US" sz="2400" dirty="0"/>
-              <a:t>Now you will practice finding money! The money will be invisible but when you find it you will hear a </a:t>
+              <a:t>Now you will </a:t>
+            </a:r>
+            <a:r>
+              <a:rPr lang="en-US" sz="2400" b="1" dirty="0"/>
+              <a:t>practice</a:t>
+            </a:r>
+            <a:r>
+              <a:rPr lang="en-US" sz="2400" dirty="0"/>
+              <a:t> finding money! The money will be invisible but when you find it you will hear a </a:t>
             </a:r>
             <a:r>
               <a:rPr lang="en-US" sz="2400" b="1" dirty="0"/>
@@ -3761,7 +3756,7 @@
         </p:blipFill>
         <p:spPr>
           <a:xfrm>
-            <a:off x="1676400" y="3690686"/>
+            <a:off x="4186052" y="4695719"/>
             <a:ext cx="914400" cy="914400"/>
           </a:xfrm>
           <a:prstGeom prst="rect">
@@ -3793,16 +3788,67 @@
           <a:p>
             <a:pPr algn="ctr"/>
             <a:r>
+              <a:rPr lang="en-US" sz="2400" b="1" dirty="0">
+                <a:solidFill>
+                  <a:schemeClr val="accent6"/>
+                </a:solidFill>
+              </a:rPr>
+              <a:t>Do you have any questions?</a:t>
+            </a:r>
+          </a:p>
+        </p:txBody>
+      </p:sp>
+      <p:sp>
+        <p:nvSpPr>
+          <p:cNvPr id="6" name="Title 1">
+            <a:extLst>
+              <a:ext uri="{FF2B5EF4-FFF2-40B4-BE49-F238E27FC236}">
+                <a16:creationId xmlns:a16="http://schemas.microsoft.com/office/drawing/2014/main" id="{89DD1203-4861-4CBE-84A1-44A2766E9D24}"/>
+              </a:ext>
+            </a:extLst>
+          </p:cNvPr>
+          <p:cNvSpPr txBox="1">
+            <a:spLocks/>
+          </p:cNvSpPr>
+          <p:nvPr/>
+        </p:nvSpPr>
+        <p:spPr>
+          <a:xfrm>
+            <a:off x="0" y="107699"/>
+            <a:ext cx="12192000" cy="361517"/>
+          </a:xfrm>
+          <a:prstGeom prst="rect">
+            <a:avLst/>
+          </a:prstGeom>
+        </p:spPr>
+        <p:txBody>
+          <a:bodyPr vert="horz" lIns="91440" tIns="45720" rIns="91440" bIns="45720" rtlCol="0" anchor="ctr">
+            <a:normAutofit fontScale="90000" lnSpcReduction="20000"/>
+          </a:bodyPr>
+          <a:lstStyle>
+            <a:lvl1pPr algn="l" defTabSz="914400" rtl="0" eaLnBrk="1" latinLnBrk="0" hangingPunct="1">
+              <a:lnSpc>
+                <a:spcPct val="90000"/>
+              </a:lnSpc>
+              <a:spcBef>
+                <a:spcPct val="0"/>
+              </a:spcBef>
+              <a:buNone/>
+              <a:defRPr sz="4400" kern="1200">
+                <a:solidFill>
+                  <a:schemeClr val="tx1"/>
+                </a:solidFill>
+                <a:latin typeface="+mj-lt"/>
+                <a:ea typeface="+mj-ea"/>
+                <a:cs typeface="+mj-cs"/>
+              </a:defRPr>
+            </a:lvl1pPr>
+          </a:lstStyle>
+          <a:p>
+            <a:pPr algn="ctr"/>
+            <a:r>
               <a:rPr lang="en-US" sz="2400" b="1" dirty="0"/>
-              <a:t>Press Spacebar to continue </a:t>
-            </a:r>
-            <a:r>
-              <a:rPr lang="mr-IN" sz="2400" b="1" dirty="0"/>
-              <a:t>…</a:t>
-            </a:r>
-            <a:r>
-              <a:rPr lang="en-US" sz="2400" b="1" dirty="0"/>
-              <a:t> </a:t>
+              <a:t>Section 1: Practice</a:t>
             </a:r>
           </a:p>
         </p:txBody>
@@ -3855,7 +3901,7 @@
         </p:nvSpPr>
         <p:spPr>
           <a:xfrm>
-            <a:off x="838200" y="247658"/>
+            <a:off x="838199" y="445191"/>
             <a:ext cx="10515600" cy="1325563"/>
           </a:xfrm>
         </p:spPr>
@@ -3957,11 +4003,11 @@
                   <a:schemeClr val="accent6"/>
                 </a:solidFill>
               </a:rPr>
-              <a:t>$0.25 </a:t>
+              <a:t>10¢</a:t>
             </a:r>
             <a:r>
               <a:rPr lang="en-US" sz="3200" dirty="0"/>
-              <a:t>worth of money! Feel free to adjust your volume as necessary!</a:t>
+              <a:t>! Feel free to adjust your volume as necessary!</a:t>
             </a:r>
           </a:p>
         </p:txBody>
@@ -3996,17 +4042,48 @@
           <a:p>
             <a:pPr algn="ctr"/>
             <a:r>
-              <a:rPr lang="en-US" sz="2400" b="1" dirty="0"/>
-              <a:t>Press Spacebar to continue </a:t>
-            </a:r>
-            <a:r>
-              <a:rPr lang="mr-IN" sz="2400" b="1" dirty="0"/>
-              <a:t>…</a:t>
-            </a:r>
-            <a:r>
-              <a:rPr lang="en-US" sz="2400" b="1" dirty="0"/>
-              <a:t> </a:t>
-            </a:r>
+              <a:rPr lang="en-US" sz="2400" b="1" dirty="0">
+                <a:solidFill>
+                  <a:schemeClr val="accent6"/>
+                </a:solidFill>
+              </a:rPr>
+              <a:t>Do you have any questions?</a:t>
+            </a:r>
+          </a:p>
+        </p:txBody>
+      </p:sp>
+      <p:sp>
+        <p:nvSpPr>
+          <p:cNvPr id="4" name="Rectangle 3">
+            <a:extLst>
+              <a:ext uri="{FF2B5EF4-FFF2-40B4-BE49-F238E27FC236}">
+                <a16:creationId xmlns:a16="http://schemas.microsoft.com/office/drawing/2014/main" id="{CE5FF8C2-A033-40D7-858A-2AA92B1586CA}"/>
+              </a:ext>
+            </a:extLst>
+          </p:cNvPr>
+          <p:cNvSpPr/>
+          <p:nvPr/>
+        </p:nvSpPr>
+        <p:spPr>
+          <a:xfrm>
+            <a:off x="4959144" y="29458"/>
+            <a:ext cx="1933286" cy="369332"/>
+          </a:xfrm>
+          <a:prstGeom prst="rect">
+            <a:avLst/>
+          </a:prstGeom>
+        </p:spPr>
+        <p:txBody>
+          <a:bodyPr wrap="none">
+            <a:spAutoFit/>
+          </a:bodyPr>
+          <a:lstStyle/>
+          <a:p>
+            <a:r>
+              <a:rPr lang="en-US" b="1" dirty="0"/>
+              <a:t>Section 1: Practice</a:t>
+            </a:r>
+            <a:endParaRPr lang="en-US" dirty="0"/>
           </a:p>
         </p:txBody>
       </p:sp>
@@ -4058,8 +4135,8 @@
         </p:nvSpPr>
         <p:spPr>
           <a:xfrm>
-            <a:off x="578690" y="353063"/>
-            <a:ext cx="11034619" cy="3075927"/>
+            <a:off x="578691" y="483692"/>
+            <a:ext cx="10932078" cy="1171564"/>
           </a:xfrm>
         </p:spPr>
         <p:txBody>
@@ -4072,79 +4149,33 @@
               <a:buNone/>
             </a:pPr>
             <a:r>
-              <a:rPr lang="en-US" sz="3600" b="1" dirty="0"/>
-              <a:t>PRACTICE: </a:t>
-            </a:r>
-            <a:r>
-              <a:rPr lang="en-US" sz="3600" dirty="0"/>
-              <a:t>MONEY COLLECTION ROUNDS</a:t>
-            </a:r>
-          </a:p>
-          <a:p>
-            <a:pPr marL="0" indent="0" algn="ctr">
-              <a:buNone/>
-            </a:pPr>
-            <a:r>
               <a:rPr lang="en-US" sz="2400" dirty="0"/>
-              <a:t>Now that you know how to find money,  you next task is to collect as much as possible in each of the following </a:t>
-            </a:r>
-            <a:r>
-              <a:rPr lang="en-US" sz="2400" b="1" i="1" dirty="0"/>
-              <a:t>Money</a:t>
+              <a:t>Now that you know how to find money, your your next task is to practice finding it as fast as you can! On each of the following rounds, you be given </a:t>
+            </a:r>
+            <a:r>
+              <a:rPr lang="en-US" sz="2400" b="1" dirty="0"/>
+              <a:t>1 minute </a:t>
             </a:r>
             <a:r>
               <a:rPr lang="en-US" sz="2400" dirty="0"/>
+              <a:t>to find</a:t>
+            </a:r>
+            <a:r>
+              <a:rPr lang="en-US" sz="2400" b="1" dirty="0"/>
               <a:t> </a:t>
-            </a:r>
-            <a:r>
-              <a:rPr lang="en-US" sz="2400" b="1" i="1" dirty="0"/>
-              <a:t>Collection Rounds</a:t>
-            </a:r>
-            <a:r>
-              <a:rPr lang="en-US" sz="2400" dirty="0"/>
-              <a:t>. </a:t>
-            </a:r>
-          </a:p>
-          <a:p>
-            <a:pPr marL="0" indent="0" algn="ctr">
-              <a:buNone/>
-            </a:pPr>
-            <a:r>
-              <a:rPr lang="en-US" sz="2400" dirty="0"/>
-              <a:t>On each round, you will be placed into the environment at a random location and will have </a:t>
-            </a:r>
-            <a:r>
-              <a:rPr lang="en-US" sz="2400" b="1" dirty="0"/>
-              <a:t>1-minute</a:t>
-            </a:r>
-            <a:r>
-              <a:rPr lang="en-US" sz="2400" dirty="0"/>
-              <a:t> to </a:t>
             </a:r>
             <a:r>
               <a:rPr lang="en-US" sz="2400" b="1" dirty="0">
                 <a:solidFill>
-                  <a:srgbClr val="FF0000"/>
+                  <a:schemeClr val="accent6"/>
                 </a:solidFill>
               </a:rPr>
-              <a:t>collect as much money as possible!!</a:t>
+              <a:t>10¢</a:t>
             </a:r>
             <a:r>
               <a:rPr lang="en-US" sz="2400" dirty="0"/>
-              <a:t> </a:t>
-            </a:r>
-          </a:p>
-          <a:p>
-            <a:pPr marL="0" indent="0" algn="ctr">
-              <a:buNone/>
-            </a:pPr>
-            <a:endParaRPr lang="en-US" sz="2400" dirty="0"/>
-          </a:p>
-          <a:p>
-            <a:pPr marL="0" indent="0" algn="ctr">
-              <a:buNone/>
-            </a:pPr>
-            <a:endParaRPr lang="en-US" sz="2400" dirty="0"/>
+              <a:t>. You can see how much you’ve collected at the top of your screen</a:t>
+            </a:r>
           </a:p>
         </p:txBody>
       </p:sp>
@@ -4156,7 +4187,7 @@
         </p:nvSpPr>
         <p:spPr>
           <a:xfrm>
-            <a:off x="3641723" y="5973619"/>
+            <a:off x="3704904" y="6154248"/>
             <a:ext cx="4782193" cy="461665"/>
           </a:xfrm>
           <a:prstGeom prst="rect">
@@ -4172,26 +4203,109 @@
           <a:p>
             <a:pPr algn="ctr"/>
             <a:r>
+              <a:rPr lang="en-US" sz="2400" b="1" dirty="0">
+                <a:solidFill>
+                  <a:schemeClr val="accent6"/>
+                </a:solidFill>
+              </a:rPr>
+              <a:t>Do you have any questions?</a:t>
+            </a:r>
+          </a:p>
+        </p:txBody>
+      </p:sp>
+      <p:sp>
+        <p:nvSpPr>
+          <p:cNvPr id="2" name="Rectangle 1">
+            <a:extLst>
+              <a:ext uri="{FF2B5EF4-FFF2-40B4-BE49-F238E27FC236}">
+                <a16:creationId xmlns:a16="http://schemas.microsoft.com/office/drawing/2014/main" id="{422146C4-0907-4124-A464-DC1E73A25CAF}"/>
+              </a:ext>
+            </a:extLst>
+          </p:cNvPr>
+          <p:cNvSpPr/>
+          <p:nvPr/>
+        </p:nvSpPr>
+        <p:spPr>
+          <a:xfrm>
+            <a:off x="178130" y="4515494"/>
+            <a:ext cx="11740738" cy="1200329"/>
+          </a:xfrm>
+          <a:prstGeom prst="rect">
+            <a:avLst/>
+          </a:prstGeom>
+        </p:spPr>
+        <p:txBody>
+          <a:bodyPr wrap="square">
+            <a:spAutoFit/>
+          </a:bodyPr>
+          <a:lstStyle/>
+          <a:p>
+            <a:pPr algn="ctr"/>
+            <a:r>
+              <a:rPr lang="en-US" sz="2400" dirty="0"/>
+              <a:t>If you find </a:t>
+            </a:r>
+            <a:r>
+              <a:rPr lang="en-US" sz="2400" b="1" dirty="0">
+                <a:solidFill>
+                  <a:schemeClr val="accent6"/>
+                </a:solidFill>
+              </a:rPr>
+              <a:t>10¢ </a:t>
+            </a:r>
+            <a:r>
+              <a:rPr lang="en-US" sz="2400" dirty="0"/>
+              <a:t>before the minute is up, the round will end and you will see a point added to the </a:t>
+            </a:r>
+            <a:r>
+              <a:rPr lang="en-US" sz="2400" b="1" dirty="0">
+                <a:solidFill>
+                  <a:schemeClr val="accent6"/>
+                </a:solidFill>
+              </a:rPr>
+              <a:t>Rounds Complete </a:t>
+            </a:r>
+            <a:r>
+              <a:rPr lang="en-US" sz="2400" dirty="0"/>
+              <a:t>at the bottom of the screen. In order to proceed to the </a:t>
+            </a:r>
+            <a:r>
               <a:rPr lang="en-US" sz="2400" b="1" dirty="0"/>
-              <a:t>Press Spacebar to continue </a:t>
-            </a:r>
-            <a:r>
-              <a:rPr lang="mr-IN" sz="2400" b="1" dirty="0"/>
-              <a:t>…</a:t>
+              <a:t>Bonus Section </a:t>
+            </a:r>
+            <a:r>
+              <a:rPr lang="en-US" sz="2400" dirty="0"/>
+              <a:t>of the experiment you must find </a:t>
+            </a:r>
+            <a:r>
+              <a:rPr lang="en-US" sz="2400" b="1" dirty="0">
+                <a:solidFill>
+                  <a:schemeClr val="accent6"/>
+                </a:solidFill>
+              </a:rPr>
+              <a:t>10¢ </a:t>
+            </a:r>
+            <a:r>
+              <a:rPr lang="en-US" sz="2400" dirty="0"/>
+              <a:t>on </a:t>
             </a:r>
             <a:r>
               <a:rPr lang="en-US" sz="2400" b="1" dirty="0"/>
-              <a:t> </a:t>
+              <a:t>3 Rounds. </a:t>
+            </a:r>
+            <a:r>
+              <a:rPr lang="en-US" sz="2400" dirty="0"/>
+              <a:t>You will be given 16 rounds to do this! </a:t>
             </a:r>
           </a:p>
         </p:txBody>
       </p:sp>
       <p:pic>
         <p:nvPicPr>
-          <p:cNvPr id="6" name="Picture 5">
-            <a:extLst>
-              <a:ext uri="{FF2B5EF4-FFF2-40B4-BE49-F238E27FC236}">
-                <a16:creationId xmlns:a16="http://schemas.microsoft.com/office/drawing/2014/main" id="{18AFBDE6-389C-44C7-BAC9-BA8592309BE2}"/>
+          <p:cNvPr id="4" name="Picture 3">
+            <a:extLst>
+              <a:ext uri="{FF2B5EF4-FFF2-40B4-BE49-F238E27FC236}">
+                <a16:creationId xmlns:a16="http://schemas.microsoft.com/office/drawing/2014/main" id="{7219D65A-A264-451E-911D-738EF7DB1F0F}"/>
               </a:ext>
             </a:extLst>
           </p:cNvPr>
@@ -4208,8 +4322,8 @@
         </p:blipFill>
         <p:spPr>
           <a:xfrm>
-            <a:off x="3484289" y="2944362"/>
-            <a:ext cx="5223420" cy="2915264"/>
+            <a:off x="4125212" y="1937550"/>
+            <a:ext cx="3941577" cy="2207024"/>
           </a:xfrm>
           <a:prstGeom prst="rect">
             <a:avLst/>
@@ -4230,6 +4344,105 @@
           </a:effectLst>
         </p:spPr>
       </p:pic>
+      <p:cxnSp>
+        <p:nvCxnSpPr>
+          <p:cNvPr id="8" name="Straight Arrow Connector 7">
+            <a:extLst>
+              <a:ext uri="{FF2B5EF4-FFF2-40B4-BE49-F238E27FC236}">
+                <a16:creationId xmlns:a16="http://schemas.microsoft.com/office/drawing/2014/main" id="{CE6CFFF7-515E-408D-B58C-E92F6D7870A1}"/>
+              </a:ext>
+            </a:extLst>
+          </p:cNvPr>
+          <p:cNvCxnSpPr>
+            <a:cxnSpLocks/>
+          </p:cNvCxnSpPr>
+          <p:nvPr/>
+        </p:nvCxnSpPr>
+        <p:spPr>
+          <a:xfrm flipV="1">
+            <a:off x="4860967" y="4116778"/>
+            <a:ext cx="938150" cy="998880"/>
+          </a:xfrm>
+          <a:prstGeom prst="straightConnector1">
+            <a:avLst/>
+          </a:prstGeom>
+          <a:ln w="57150">
+            <a:solidFill>
+              <a:srgbClr val="2DD415"/>
+            </a:solidFill>
+            <a:tailEnd type="triangle"/>
+          </a:ln>
+        </p:spPr>
+        <p:style>
+          <a:lnRef idx="1">
+            <a:schemeClr val="accent1"/>
+          </a:lnRef>
+          <a:fillRef idx="0">
+            <a:schemeClr val="accent1"/>
+          </a:fillRef>
+          <a:effectRef idx="0">
+            <a:schemeClr val="accent1"/>
+          </a:effectRef>
+          <a:fontRef idx="minor">
+            <a:schemeClr val="tx1"/>
+          </a:fontRef>
+        </p:style>
+      </p:cxnSp>
+      <p:sp>
+        <p:nvSpPr>
+          <p:cNvPr id="11" name="Title 1">
+            <a:extLst>
+              <a:ext uri="{FF2B5EF4-FFF2-40B4-BE49-F238E27FC236}">
+                <a16:creationId xmlns:a16="http://schemas.microsoft.com/office/drawing/2014/main" id="{35E2A03D-184E-4FF2-BEB9-0B196AB11381}"/>
+              </a:ext>
+            </a:extLst>
+          </p:cNvPr>
+          <p:cNvSpPr txBox="1">
+            <a:spLocks/>
+          </p:cNvSpPr>
+          <p:nvPr/>
+        </p:nvSpPr>
+        <p:spPr>
+          <a:xfrm>
+            <a:off x="0" y="107699"/>
+            <a:ext cx="12192000" cy="361517"/>
+          </a:xfrm>
+          <a:prstGeom prst="rect">
+            <a:avLst/>
+          </a:prstGeom>
+        </p:spPr>
+        <p:txBody>
+          <a:bodyPr vert="horz" lIns="91440" tIns="45720" rIns="91440" bIns="45720" rtlCol="0" anchor="ctr">
+            <a:normAutofit fontScale="90000" lnSpcReduction="20000"/>
+          </a:bodyPr>
+          <a:lstStyle>
+            <a:lvl1pPr algn="l" defTabSz="914400" rtl="0" eaLnBrk="1" latinLnBrk="0" hangingPunct="1">
+              <a:lnSpc>
+                <a:spcPct val="90000"/>
+              </a:lnSpc>
+              <a:spcBef>
+                <a:spcPct val="0"/>
+              </a:spcBef>
+              <a:buNone/>
+              <a:defRPr sz="4400" kern="1200">
+                <a:solidFill>
+                  <a:schemeClr val="tx1"/>
+                </a:solidFill>
+                <a:latin typeface="+mj-lt"/>
+                <a:ea typeface="+mj-ea"/>
+                <a:cs typeface="+mj-cs"/>
+              </a:defRPr>
+            </a:lvl1pPr>
+          </a:lstStyle>
+          <a:p>
+            <a:pPr algn="ctr"/>
+            <a:r>
+              <a:rPr lang="en-US" sz="2400" b="1" dirty="0"/>
+              <a:t>Section 1: Practice</a:t>
+            </a:r>
+          </a:p>
+        </p:txBody>
+      </p:sp>
     </p:spTree>
     <p:extLst>
       <p:ext uri="{BB962C8B-B14F-4D97-AF65-F5344CB8AC3E}">
@@ -4278,8 +4491,8 @@
         </p:nvSpPr>
         <p:spPr>
           <a:xfrm>
-            <a:off x="578690" y="353063"/>
-            <a:ext cx="11034619" cy="3075927"/>
+            <a:off x="578690" y="729115"/>
+            <a:ext cx="11034619" cy="1839914"/>
           </a:xfrm>
         </p:spPr>
         <p:txBody>
@@ -4287,19 +4500,6 @@
             <a:normAutofit/>
           </a:bodyPr>
           <a:lstStyle/>
-          <a:p>
-            <a:pPr marL="0" indent="0" algn="ctr">
-              <a:buNone/>
-            </a:pPr>
-            <a:r>
-              <a:rPr lang="en-US" sz="3600" b="1" dirty="0"/>
-              <a:t>PRACTICE: </a:t>
-            </a:r>
-            <a:r>
-              <a:rPr lang="en-US" sz="3600" dirty="0"/>
-              <a:t>MONEY COLLECTION ROUNDS</a:t>
-            </a:r>
-          </a:p>
           <a:p>
             <a:pPr marL="0" indent="0" algn="ctr">
               <a:buNone/>
@@ -4343,14 +4543,8 @@
             </a:r>
             <a:r>
               <a:rPr lang="en-US" sz="2400" dirty="0"/>
-              <a:t> every time you collect money and you will be able to see how much you’ve collected at the top of the screen!</a:t>
-            </a:r>
-          </a:p>
-          <a:p>
-            <a:pPr marL="0" indent="0" algn="ctr">
-              <a:buNone/>
-            </a:pPr>
-            <a:endParaRPr lang="en-US" sz="2400" dirty="0"/>
+              <a:t> every time you collect money and you will be able to see how much you’ve collected at the top of the screen! </a:t>
+            </a:r>
           </a:p>
         </p:txBody>
       </p:sp>
@@ -4376,7 +4570,7 @@
         </p:blipFill>
         <p:spPr>
           <a:xfrm>
-            <a:off x="1580818" y="2453676"/>
+            <a:off x="1659987" y="2474673"/>
             <a:ext cx="3826042" cy="2144927"/>
           </a:xfrm>
           <a:prstGeom prst="rect">
@@ -4414,7 +4608,7 @@
         </p:nvCxnSpPr>
         <p:spPr>
           <a:xfrm>
-            <a:off x="5556133" y="3526139"/>
+            <a:off x="5635302" y="3547136"/>
             <a:ext cx="1270861" cy="1"/>
           </a:xfrm>
           <a:prstGeom prst="straightConnector1">
@@ -4450,7 +4644,7 @@
         </p:nvSpPr>
         <p:spPr>
           <a:xfrm>
-            <a:off x="3641723" y="5973619"/>
+            <a:off x="3649640" y="6150504"/>
             <a:ext cx="4782193" cy="461665"/>
           </a:xfrm>
           <a:prstGeom prst="rect">
@@ -4466,16 +4660,12 @@
           <a:p>
             <a:pPr algn="ctr"/>
             <a:r>
-              <a:rPr lang="en-US" sz="2400" b="1" dirty="0"/>
-              <a:t>Press Spacebar to continue </a:t>
-            </a:r>
-            <a:r>
-              <a:rPr lang="mr-IN" sz="2400" b="1" dirty="0"/>
-              <a:t>…</a:t>
-            </a:r>
-            <a:r>
-              <a:rPr lang="en-US" sz="2400" b="1" dirty="0"/>
-              <a:t> </a:t>
+              <a:rPr lang="en-US" sz="2400" b="1" dirty="0">
+                <a:solidFill>
+                  <a:schemeClr val="accent6"/>
+                </a:solidFill>
+              </a:rPr>
+              <a:t>Do you have any questions?</a:t>
             </a:r>
           </a:p>
         </p:txBody>
@@ -4502,7 +4692,7 @@
         </p:blipFill>
         <p:spPr>
           <a:xfrm>
-            <a:off x="6919524" y="2508658"/>
+            <a:off x="6998693" y="2529655"/>
             <a:ext cx="3826042" cy="2135368"/>
           </a:xfrm>
           <a:prstGeom prst="rect">
@@ -4568,59 +4758,112 @@
       </p:cxnSp>
       <p:sp>
         <p:nvSpPr>
-          <p:cNvPr id="14" name="TextBox 13">
-            <a:extLst>
-              <a:ext uri="{FF2B5EF4-FFF2-40B4-BE49-F238E27FC236}">
-                <a16:creationId xmlns:a16="http://schemas.microsoft.com/office/drawing/2014/main" id="{5964BDEF-CE99-4D3E-9DF7-DE2328C23EE6}"/>
-              </a:ext>
-            </a:extLst>
-          </p:cNvPr>
-          <p:cNvSpPr txBox="1"/>
+          <p:cNvPr id="4" name="Rectangle 3">
+            <a:extLst>
+              <a:ext uri="{FF2B5EF4-FFF2-40B4-BE49-F238E27FC236}">
+                <a16:creationId xmlns:a16="http://schemas.microsoft.com/office/drawing/2014/main" id="{3E695ABA-60F5-4FBF-BA99-A2D0874D582F}"/>
+              </a:ext>
+            </a:extLst>
+          </p:cNvPr>
+          <p:cNvSpPr/>
           <p:nvPr/>
         </p:nvSpPr>
         <p:spPr>
           <a:xfrm>
-            <a:off x="1444277" y="4997412"/>
-            <a:ext cx="9303444" cy="830997"/>
+            <a:off x="178128" y="5027178"/>
+            <a:ext cx="11629901" cy="830997"/>
           </a:xfrm>
           <a:prstGeom prst="rect">
             <a:avLst/>
           </a:prstGeom>
-          <a:noFill/>
         </p:spPr>
         <p:txBody>
-          <a:bodyPr wrap="none" rtlCol="0">
+          <a:bodyPr wrap="square">
             <a:spAutoFit/>
           </a:bodyPr>
           <a:lstStyle/>
           <a:p>
-            <a:r>
-              <a:rPr lang="en-US" sz="2400" b="1" dirty="0"/>
-              <a:t>Note: </a:t>
-            </a:r>
+            <a:pPr algn="ctr"/>
             <a:r>
               <a:rPr lang="en-US" sz="2400" dirty="0"/>
-              <a:t>There is an </a:t>
+              <a:t>If you collect </a:t>
             </a:r>
             <a:r>
               <a:rPr lang="en-US" sz="2400" b="1" dirty="0">
                 <a:solidFill>
-                  <a:srgbClr val="FF0000"/>
+                  <a:schemeClr val="accent6"/>
                 </a:solidFill>
               </a:rPr>
-              <a:t>UNLIMITED</a:t>
+              <a:t>10¢ </a:t>
             </a:r>
             <a:r>
               <a:rPr lang="en-US" sz="2400" dirty="0"/>
-              <a:t> amount of money to collect in each round, </a:t>
-            </a:r>
-          </a:p>
+              <a:t>before the minute is up the round will end and a point will be added to your </a:t>
+            </a:r>
+            <a:r>
+              <a:rPr lang="en-US" sz="2400" b="1" dirty="0"/>
+              <a:t>Rounds Complete </a:t>
+            </a:r>
+            <a:r>
+              <a:rPr lang="en-US" sz="2400" dirty="0"/>
+              <a:t>total</a:t>
+            </a:r>
+          </a:p>
+        </p:txBody>
+      </p:sp>
+      <p:sp>
+        <p:nvSpPr>
+          <p:cNvPr id="11" name="Title 1">
+            <a:extLst>
+              <a:ext uri="{FF2B5EF4-FFF2-40B4-BE49-F238E27FC236}">
+                <a16:creationId xmlns:a16="http://schemas.microsoft.com/office/drawing/2014/main" id="{C2EB8BAB-79D0-475D-BFE1-093E876B3A67}"/>
+              </a:ext>
+            </a:extLst>
+          </p:cNvPr>
+          <p:cNvSpPr txBox="1">
+            <a:spLocks/>
+          </p:cNvSpPr>
+          <p:nvPr/>
+        </p:nvSpPr>
+        <p:spPr>
+          <a:xfrm>
+            <a:off x="0" y="107699"/>
+            <a:ext cx="12192000" cy="361517"/>
+          </a:xfrm>
+          <a:prstGeom prst="rect">
+            <a:avLst/>
+          </a:prstGeom>
+        </p:spPr>
+        <p:txBody>
+          <a:bodyPr vert="horz" lIns="91440" tIns="45720" rIns="91440" bIns="45720" rtlCol="0" anchor="ctr">
+            <a:normAutofit fontScale="90000" lnSpcReduction="20000"/>
+          </a:bodyPr>
+          <a:lstStyle>
+            <a:lvl1pPr algn="l" defTabSz="914400" rtl="0" eaLnBrk="1" latinLnBrk="0" hangingPunct="1">
+              <a:lnSpc>
+                <a:spcPct val="90000"/>
+              </a:lnSpc>
+              <a:spcBef>
+                <a:spcPct val="0"/>
+              </a:spcBef>
+              <a:buNone/>
+              <a:defRPr sz="4400" kern="1200">
+                <a:solidFill>
+                  <a:schemeClr val="tx1"/>
+                </a:solidFill>
+                <a:latin typeface="+mj-lt"/>
+                <a:ea typeface="+mj-ea"/>
+                <a:cs typeface="+mj-cs"/>
+              </a:defRPr>
+            </a:lvl1pPr>
+          </a:lstStyle>
           <a:p>
             <a:pPr algn="ctr"/>
             <a:r>
-              <a:rPr lang="en-US" sz="2400" dirty="0"/>
-              <a:t>so try to collect as much as possible!</a:t>
-            </a:r>
+              <a:rPr lang="en-US" sz="2400" b="1" dirty="0"/>
+              <a:t>Section 1: Practice</a:t>
+            </a:r>
+            <a:endParaRPr lang="en-US" sz="2400" b="1" u="sng" dirty="0"/>
           </a:p>
         </p:txBody>
       </p:sp>
@@ -4672,7 +4915,7 @@
         </p:nvSpPr>
         <p:spPr>
           <a:xfrm>
-            <a:off x="0" y="234105"/>
+            <a:off x="0" y="653700"/>
             <a:ext cx="12192000" cy="1879704"/>
           </a:xfrm>
         </p:spPr>
@@ -4681,19 +4924,6 @@
             <a:normAutofit/>
           </a:bodyPr>
           <a:lstStyle/>
-          <a:p>
-            <a:pPr marL="0" indent="0" algn="ctr">
-              <a:buNone/>
-            </a:pPr>
-            <a:r>
-              <a:rPr lang="en-US" sz="3600" b="1" dirty="0"/>
-              <a:t>PRACTICE:</a:t>
-            </a:r>
-            <a:r>
-              <a:rPr lang="en-US" sz="3600" dirty="0"/>
-              <a:t> MONEY COLLECTION ROUNDS</a:t>
-            </a:r>
-          </a:p>
           <a:p>
             <a:pPr marL="0" indent="0" algn="ctr">
               <a:buNone/>
@@ -4918,7 +5148,39 @@
             <a:pPr algn="ctr"/>
             <a:r>
               <a:rPr lang="en-US" sz="2400" dirty="0"/>
-              <a:t>You will still be collecting money, but you won’t know how much you collected on these rounds until the end of the Experiment!</a:t>
+              <a:t>Just like in the other rounds, if you reach </a:t>
+            </a:r>
+            <a:r>
+              <a:rPr lang="en-US" sz="2400" b="1" dirty="0">
+                <a:solidFill>
+                  <a:schemeClr val="accent6"/>
+                </a:solidFill>
+              </a:rPr>
+              <a:t>10¢</a:t>
+            </a:r>
+            <a:r>
+              <a:rPr lang="en-US" sz="2400" b="1" dirty="0">
+                <a:solidFill>
+                  <a:srgbClr val="2DD415"/>
+                </a:solidFill>
+              </a:rPr>
+              <a:t> </a:t>
+            </a:r>
+            <a:r>
+              <a:rPr lang="en-US" sz="2400" dirty="0"/>
+              <a:t>the round will end and a point will be added to your </a:t>
+            </a:r>
+            <a:r>
+              <a:rPr lang="en-US" sz="2400" b="1" dirty="0">
+                <a:solidFill>
+                  <a:schemeClr val="accent6"/>
+                </a:solidFill>
+              </a:rPr>
+              <a:t>Rounds Complete </a:t>
+            </a:r>
+            <a:r>
+              <a:rPr lang="en-US" sz="2400" dirty="0"/>
+              <a:t>total.</a:t>
             </a:r>
           </a:p>
           <a:p>
@@ -4953,7 +5215,23 @@
                   <a:srgbClr val="FF0000"/>
                 </a:solidFill>
               </a:rPr>
-              <a:t>Use what you’ve learned from the Feedback Rounds to guide your search!</a:t>
+              <a:t>Use what you’ve learned from the </a:t>
+            </a:r>
+            <a:r>
+              <a:rPr lang="en-US" sz="2400" b="1" dirty="0">
+                <a:solidFill>
+                  <a:srgbClr val="FF0000"/>
+                </a:solidFill>
+              </a:rPr>
+              <a:t>Feedback Rounds </a:t>
+            </a:r>
+            <a:r>
+              <a:rPr lang="en-US" sz="2400" dirty="0">
+                <a:solidFill>
+                  <a:srgbClr val="FF0000"/>
+                </a:solidFill>
+              </a:rPr>
+              <a:t>to guide your search!</a:t>
             </a:r>
             <a:endParaRPr lang="en-US" sz="2400" dirty="0"/>
           </a:p>
@@ -5053,10 +5331,10 @@
       </p:cxnSp>
       <p:sp>
         <p:nvSpPr>
-          <p:cNvPr id="17" name="TextBox 16">
-            <a:extLst>
-              <a:ext uri="{FF2B5EF4-FFF2-40B4-BE49-F238E27FC236}">
-                <a16:creationId xmlns:a16="http://schemas.microsoft.com/office/drawing/2014/main" id="{E91F4ED1-D923-4A02-9F60-115F95179E45}"/>
+          <p:cNvPr id="10" name="TextBox 9">
+            <a:extLst>
+              <a:ext uri="{FF2B5EF4-FFF2-40B4-BE49-F238E27FC236}">
+                <a16:creationId xmlns:a16="http://schemas.microsoft.com/office/drawing/2014/main" id="{BBB9FC54-0FF1-413F-9D5B-B107CB9B2E18}"/>
               </a:ext>
             </a:extLst>
           </p:cNvPr>
@@ -5065,7 +5343,7 @@
         </p:nvSpPr>
         <p:spPr>
           <a:xfrm>
-            <a:off x="3704902" y="6162230"/>
+            <a:off x="3649640" y="6150504"/>
             <a:ext cx="4782193" cy="461665"/>
           </a:xfrm>
           <a:prstGeom prst="rect">
@@ -5081,17 +5359,48 @@
           <a:p>
             <a:pPr algn="ctr"/>
             <a:r>
-              <a:rPr lang="en-US" sz="2400" b="1" dirty="0"/>
-              <a:t>Press Spacebar to continue </a:t>
-            </a:r>
-            <a:r>
-              <a:rPr lang="mr-IN" sz="2400" b="1" dirty="0"/>
-              <a:t>…</a:t>
-            </a:r>
-            <a:r>
-              <a:rPr lang="en-US" sz="2400" b="1" dirty="0"/>
-              <a:t> </a:t>
-            </a:r>
+              <a:rPr lang="en-US" sz="2400" b="1" dirty="0">
+                <a:solidFill>
+                  <a:schemeClr val="accent6"/>
+                </a:solidFill>
+              </a:rPr>
+              <a:t>Do you have any questions?</a:t>
+            </a:r>
+          </a:p>
+        </p:txBody>
+      </p:sp>
+      <p:sp>
+        <p:nvSpPr>
+          <p:cNvPr id="8" name="Rectangle 7">
+            <a:extLst>
+              <a:ext uri="{FF2B5EF4-FFF2-40B4-BE49-F238E27FC236}">
+                <a16:creationId xmlns:a16="http://schemas.microsoft.com/office/drawing/2014/main" id="{8A584CBE-A602-48B8-BA30-F921DA85EA92}"/>
+              </a:ext>
+            </a:extLst>
+          </p:cNvPr>
+          <p:cNvSpPr/>
+          <p:nvPr/>
+        </p:nvSpPr>
+        <p:spPr>
+          <a:xfrm>
+            <a:off x="5129356" y="61165"/>
+            <a:ext cx="1933286" cy="369332"/>
+          </a:xfrm>
+          <a:prstGeom prst="rect">
+            <a:avLst/>
+          </a:prstGeom>
+        </p:spPr>
+        <p:txBody>
+          <a:bodyPr wrap="none">
+            <a:spAutoFit/>
+          </a:bodyPr>
+          <a:lstStyle/>
+          <a:p>
+            <a:r>
+              <a:rPr lang="en-US" b="1" dirty="0"/>
+              <a:t>Section 1: Practice</a:t>
+            </a:r>
+            <a:endParaRPr lang="en-US" dirty="0"/>
           </a:p>
         </p:txBody>
       </p:sp>
@@ -5327,7 +5636,7 @@
             <a:noFill/>
             <a:extLst>
               <a:ext uri="{909E8E84-426E-40dd-AFC4-6F175D3DCCD1}">
-                <a14:hiddenFill xmlns:a14="http://schemas.microsoft.com/office/drawing/2010/main" xmlns="">
+                <a14:hiddenFill xmlns="" xmlns:a14="http://schemas.microsoft.com/office/drawing/2010/main">
                   <a:solidFill>
                     <a:srgbClr val="FFFFFF"/>
                   </a:solidFill>
@@ -5372,7 +5681,7 @@
             <a:noFill/>
             <a:extLst>
               <a:ext uri="{909E8E84-426E-40dd-AFC4-6F175D3DCCD1}">
-                <a14:hiddenFill xmlns:a14="http://schemas.microsoft.com/office/drawing/2010/main" xmlns="">
+                <a14:hiddenFill xmlns="" xmlns:a14="http://schemas.microsoft.com/office/drawing/2010/main">
                   <a:solidFill>
                     <a:srgbClr val="FFFFFF"/>
                   </a:solidFill>
@@ -5417,7 +5726,7 @@
             <a:noFill/>
             <a:extLst>
               <a:ext uri="{909E8E84-426E-40dd-AFC4-6F175D3DCCD1}">
-                <a14:hiddenFill xmlns:a14="http://schemas.microsoft.com/office/drawing/2010/main" xmlns="">
+                <a14:hiddenFill xmlns="" xmlns:a14="http://schemas.microsoft.com/office/drawing/2010/main">
                   <a:solidFill>
                     <a:srgbClr val="FFFFFF"/>
                   </a:solidFill>
@@ -5475,8 +5784,8 @@
         </p:nvSpPr>
         <p:spPr>
           <a:xfrm>
-            <a:off x="0" y="37580"/>
-            <a:ext cx="12192000" cy="3675437"/>
+            <a:off x="443346" y="132583"/>
+            <a:ext cx="11305309" cy="3675437"/>
           </a:xfrm>
         </p:spPr>
         <p:txBody>
@@ -5488,10 +5797,7 @@
             <a:pPr marL="0" indent="0" algn="ctr">
               <a:buNone/>
             </a:pPr>
-            <a:r>
-              <a:rPr lang="en-US" sz="3600" b="1" dirty="0"/>
-              <a:t>Practice on your own!</a:t>
-            </a:r>
+            <a:endParaRPr lang="en-US" sz="2400" dirty="0"/>
           </a:p>
           <a:p>
             <a:pPr marL="0" indent="0" algn="ctr">
@@ -5530,23 +5836,7 @@
             </a:pPr>
             <a:r>
               <a:rPr lang="en-US" sz="2400" dirty="0"/>
-              <a:t>You will now complete several </a:t>
-            </a:r>
-            <a:r>
-              <a:rPr lang="en-US" sz="2400" b="1" dirty="0"/>
-              <a:t>Feedback </a:t>
-            </a:r>
-            <a:r>
-              <a:rPr lang="en-US" sz="2400" dirty="0"/>
-              <a:t>and </a:t>
-            </a:r>
-            <a:r>
-              <a:rPr lang="en-US" sz="2400" b="1" dirty="0"/>
-              <a:t>No Feedback </a:t>
-            </a:r>
-            <a:r>
-              <a:rPr lang="en-US" sz="2400" dirty="0"/>
-              <a:t>rounds on your own. </a:t>
+              <a:t>You will now complete the remaining rounds on your own. </a:t>
             </a:r>
             <a:r>
               <a:rPr lang="en-US" altLang="zh-CN" sz="2400" b="1" dirty="0"/>
@@ -5554,30 +5844,44 @@
             </a:r>
             <a:r>
               <a:rPr lang="en-US" altLang="zh-CN" sz="2400" dirty="0"/>
-              <a:t> the better you do during these </a:t>
-            </a:r>
-            <a:r>
-              <a:rPr lang="en-US" altLang="zh-CN" sz="2400" b="1" dirty="0"/>
-              <a:t>PRACTICE </a:t>
-            </a:r>
-            <a:r>
-              <a:rPr lang="en-US" altLang="zh-CN" sz="2400" dirty="0"/>
-              <a:t>rounds, the better you will do in </a:t>
-            </a:r>
-            <a:r>
-              <a:rPr lang="en-US" altLang="zh-CN" sz="2400" b="1" dirty="0"/>
-              <a:t>BONUS PAY </a:t>
-            </a:r>
-            <a:r>
-              <a:rPr lang="en-US" altLang="zh-CN" sz="2400" dirty="0"/>
-              <a:t>section where you’ll get to keep all the money you collect! </a:t>
-            </a:r>
-          </a:p>
-          <a:p>
-            <a:pPr marL="0" indent="0" algn="ctr">
-              <a:buNone/>
-            </a:pPr>
-            <a:endParaRPr lang="en-US" sz="2400" dirty="0"/>
+              <a:t> you must collect </a:t>
+            </a:r>
+            <a:r>
+              <a:rPr lang="en-US" sz="2400" b="1" dirty="0">
+                <a:solidFill>
+                  <a:schemeClr val="accent6"/>
+                </a:solidFill>
+              </a:rPr>
+              <a:t>10¢</a:t>
+            </a:r>
+            <a:r>
+              <a:rPr lang="en-US" sz="2400" b="1" dirty="0">
+                <a:solidFill>
+                  <a:srgbClr val="2DD415"/>
+                </a:solidFill>
+              </a:rPr>
+              <a:t> </a:t>
+            </a:r>
+            <a:r>
+              <a:rPr lang="en-US" sz="2400" dirty="0"/>
+              <a:t>on </a:t>
+            </a:r>
+            <a:r>
+              <a:rPr lang="en-US" sz="2400" b="1" dirty="0"/>
+              <a:t>3 rounds </a:t>
+            </a:r>
+            <a:r>
+              <a:rPr lang="en-US" sz="2400" dirty="0"/>
+              <a:t>in order to move on to the </a:t>
+            </a:r>
+            <a:r>
+              <a:rPr lang="en-US" sz="2400" b="1" dirty="0"/>
+              <a:t>Bonus Section </a:t>
+            </a:r>
+            <a:r>
+              <a:rPr lang="en-US" sz="2400" dirty="0"/>
+              <a:t>of the experiment.</a:t>
+            </a:r>
           </a:p>
         </p:txBody>
       </p:sp>
@@ -5619,65 +5923,6 @@
           </a:p>
         </p:txBody>
       </p:sp>
-      <p:pic>
-        <p:nvPicPr>
-          <p:cNvPr id="1026" name="Picture 2" descr="Image result for practice">
-            <a:extLst>
-              <a:ext uri="{FF2B5EF4-FFF2-40B4-BE49-F238E27FC236}">
-                <a16:creationId xmlns:a16="http://schemas.microsoft.com/office/drawing/2014/main" id="{062B155C-ED25-4874-AD39-6D6C3C426BB3}"/>
-              </a:ext>
-            </a:extLst>
-          </p:cNvPr>
-          <p:cNvPicPr>
-            <a:picLocks noChangeAspect="1" noChangeArrowheads="1"/>
-          </p:cNvPicPr>
-          <p:nvPr/>
-        </p:nvPicPr>
-        <p:blipFill>
-          <a:blip r:embed="rId2">
-            <a:extLst>
-              <a:ext uri="{28A0092B-C50C-407E-A947-70E740481C1C}">
-                <a14:useLocalDpi xmlns:a14="http://schemas.microsoft.com/office/drawing/2010/main" val="0"/>
-              </a:ext>
-            </a:extLst>
-          </a:blip>
-          <a:srcRect/>
-          <a:stretch>
-            <a:fillRect/>
-          </a:stretch>
-        </p:blipFill>
-        <p:spPr bwMode="auto">
-          <a:xfrm>
-            <a:off x="3765848" y="2951179"/>
-            <a:ext cx="4660304" cy="2161997"/>
-          </a:xfrm>
-          <a:prstGeom prst="rect">
-            <a:avLst/>
-          </a:prstGeom>
-          <a:ln w="28575" cap="sq">
-            <a:solidFill>
-              <a:srgbClr val="000000"/>
-            </a:solidFill>
-            <a:miter lim="800000"/>
-          </a:ln>
-          <a:effectLst>
-            <a:outerShdw blurRad="57150" dist="50800" dir="2700000" algn="tl" rotWithShape="0">
-              <a:srgbClr val="000000">
-                <a:alpha val="40000"/>
-              </a:srgbClr>
-            </a:outerShdw>
-          </a:effectLst>
-          <a:extLst>
-            <a:ext uri="{909E8E84-426E-40DD-AFC4-6F175D3DCCD1}">
-              <a14:hiddenFill xmlns:a14="http://schemas.microsoft.com/office/drawing/2010/main">
-                <a:solidFill>
-                  <a:srgbClr val="FFFFFF"/>
-                </a:solidFill>
-              </a14:hiddenFill>
-            </a:ext>
-          </a:extLst>
-        </p:spPr>
-      </p:pic>
       <p:sp>
         <p:nvSpPr>
           <p:cNvPr id="2" name="Rectangle 1">
@@ -5708,11 +5953,208 @@
             <a:pPr algn="ctr"/>
             <a:r>
               <a:rPr lang="en-US" sz="2400" dirty="0"/>
-              <a:t>At the end of this section you will be instructed to notify the experimenter, any last questions?</a:t>
-            </a:r>
-          </a:p>
-        </p:txBody>
-      </p:sp>
+              <a:t>At the end of this section you will be instructed to notify the experimenter</a:t>
+            </a:r>
+          </a:p>
+        </p:txBody>
+      </p:sp>
+      <p:sp>
+        <p:nvSpPr>
+          <p:cNvPr id="4" name="Rectangle 3">
+            <a:extLst>
+              <a:ext uri="{FF2B5EF4-FFF2-40B4-BE49-F238E27FC236}">
+                <a16:creationId xmlns:a16="http://schemas.microsoft.com/office/drawing/2014/main" id="{39905DF0-24D5-41E1-8DBD-6D453F5FD43A}"/>
+              </a:ext>
+            </a:extLst>
+          </p:cNvPr>
+          <p:cNvSpPr/>
+          <p:nvPr/>
+        </p:nvSpPr>
+        <p:spPr>
+          <a:xfrm>
+            <a:off x="4998728" y="37580"/>
+            <a:ext cx="1933286" cy="369332"/>
+          </a:xfrm>
+          <a:prstGeom prst="rect">
+            <a:avLst/>
+          </a:prstGeom>
+        </p:spPr>
+        <p:txBody>
+          <a:bodyPr wrap="none">
+            <a:spAutoFit/>
+          </a:bodyPr>
+          <a:lstStyle/>
+          <a:p>
+            <a:r>
+              <a:rPr lang="en-US" b="1" dirty="0"/>
+              <a:t>Section 1: Practice</a:t>
+            </a:r>
+            <a:endParaRPr lang="en-US" dirty="0"/>
+          </a:p>
+        </p:txBody>
+      </p:sp>
+      <p:grpSp>
+        <p:nvGrpSpPr>
+          <p:cNvPr id="7" name="Group 6">
+            <a:extLst>
+              <a:ext uri="{FF2B5EF4-FFF2-40B4-BE49-F238E27FC236}">
+                <a16:creationId xmlns:a16="http://schemas.microsoft.com/office/drawing/2014/main" id="{B0326CA2-EFC0-47EC-98D6-E37ECE9DE4F4}"/>
+              </a:ext>
+            </a:extLst>
+          </p:cNvPr>
+          <p:cNvGrpSpPr/>
+          <p:nvPr/>
+        </p:nvGrpSpPr>
+        <p:grpSpPr>
+          <a:xfrm>
+            <a:off x="2941320" y="2851463"/>
+            <a:ext cx="6309360" cy="2103120"/>
+            <a:chOff x="2893819" y="2851463"/>
+            <a:chExt cx="6309360" cy="2103120"/>
+          </a:xfrm>
+        </p:grpSpPr>
+        <p:pic>
+          <p:nvPicPr>
+            <p:cNvPr id="6" name="Picture 2" descr="Check Mark Vector Icon - Download Free Vectors, Clipart Graphics ...">
+              <a:extLst>
+                <a:ext uri="{FF2B5EF4-FFF2-40B4-BE49-F238E27FC236}">
+                  <a16:creationId xmlns:a16="http://schemas.microsoft.com/office/drawing/2014/main" id="{423FB583-5D88-4319-919F-833610147B85}"/>
+                </a:ext>
+              </a:extLst>
+            </p:cNvPr>
+            <p:cNvPicPr>
+              <a:picLocks noChangeAspect="1" noChangeArrowheads="1"/>
+            </p:cNvPicPr>
+            <p:nvPr/>
+          </p:nvPicPr>
+          <p:blipFill>
+            <a:blip r:embed="rId2">
+              <a:extLst>
+                <a:ext uri="{28A0092B-C50C-407E-A947-70E740481C1C}">
+                  <a14:useLocalDpi xmlns:a14="http://schemas.microsoft.com/office/drawing/2010/main" val="0"/>
+                </a:ext>
+              </a:extLst>
+            </a:blip>
+            <a:srcRect/>
+            <a:stretch>
+              <a:fillRect/>
+            </a:stretch>
+          </p:blipFill>
+          <p:spPr bwMode="auto">
+            <a:xfrm>
+              <a:off x="2893819" y="2851463"/>
+              <a:ext cx="2103120" cy="2103120"/>
+            </a:xfrm>
+            <a:prstGeom prst="rect">
+              <a:avLst/>
+            </a:prstGeom>
+            <a:noFill/>
+            <a:extLst>
+              <a:ext uri="{909E8E84-426E-40DD-AFC4-6F175D3DCCD1}">
+                <a14:hiddenFill xmlns:a14="http://schemas.microsoft.com/office/drawing/2010/main">
+                  <a:solidFill>
+                    <a:srgbClr val="FFFFFF"/>
+                  </a:solidFill>
+                </a14:hiddenFill>
+              </a:ext>
+            </a:extLst>
+          </p:spPr>
+        </p:pic>
+        <p:pic>
+          <p:nvPicPr>
+            <p:cNvPr id="1028" name="Picture 4" descr="Check Mark Vector Icon - Download Free Vectors, Clipart Graphics ...">
+              <a:extLst>
+                <a:ext uri="{FF2B5EF4-FFF2-40B4-BE49-F238E27FC236}">
+                  <a16:creationId xmlns:a16="http://schemas.microsoft.com/office/drawing/2014/main" id="{D008F0A9-359D-41C1-802C-1E60E6875A36}"/>
+                </a:ext>
+              </a:extLst>
+            </p:cNvPr>
+            <p:cNvPicPr>
+              <a:picLocks noChangeAspect="1" noChangeArrowheads="1"/>
+            </p:cNvPicPr>
+            <p:nvPr/>
+          </p:nvPicPr>
+          <p:blipFill>
+            <a:blip r:embed="rId2">
+              <a:extLst>
+                <a:ext uri="{28A0092B-C50C-407E-A947-70E740481C1C}">
+                  <a14:useLocalDpi xmlns:a14="http://schemas.microsoft.com/office/drawing/2010/main" val="0"/>
+                </a:ext>
+              </a:extLst>
+            </a:blip>
+            <a:srcRect/>
+            <a:stretch>
+              <a:fillRect/>
+            </a:stretch>
+          </p:blipFill>
+          <p:spPr bwMode="auto">
+            <a:xfrm>
+              <a:off x="4996939" y="2851463"/>
+              <a:ext cx="2103120" cy="2103120"/>
+            </a:xfrm>
+            <a:prstGeom prst="rect">
+              <a:avLst/>
+            </a:prstGeom>
+            <a:noFill/>
+            <a:extLst>
+              <a:ext uri="{909E8E84-426E-40DD-AFC4-6F175D3DCCD1}">
+                <a14:hiddenFill xmlns:a14="http://schemas.microsoft.com/office/drawing/2010/main">
+                  <a:solidFill>
+                    <a:srgbClr val="FFFFFF"/>
+                  </a:solidFill>
+                </a14:hiddenFill>
+              </a:ext>
+            </a:extLst>
+          </p:spPr>
+        </p:pic>
+        <p:pic>
+          <p:nvPicPr>
+            <p:cNvPr id="1030" name="Picture 6" descr="Check Mark Vector Icon - Download Free Vectors, Clipart Graphics ...">
+              <a:extLst>
+                <a:ext uri="{FF2B5EF4-FFF2-40B4-BE49-F238E27FC236}">
+                  <a16:creationId xmlns:a16="http://schemas.microsoft.com/office/drawing/2014/main" id="{626E368C-DC27-4D0B-B516-DD357D9EEDBA}"/>
+                </a:ext>
+              </a:extLst>
+            </p:cNvPr>
+            <p:cNvPicPr>
+              <a:picLocks noChangeAspect="1" noChangeArrowheads="1"/>
+            </p:cNvPicPr>
+            <p:nvPr/>
+          </p:nvPicPr>
+          <p:blipFill>
+            <a:blip r:embed="rId2">
+              <a:extLst>
+                <a:ext uri="{28A0092B-C50C-407E-A947-70E740481C1C}">
+                  <a14:useLocalDpi xmlns:a14="http://schemas.microsoft.com/office/drawing/2010/main" val="0"/>
+                </a:ext>
+              </a:extLst>
+            </a:blip>
+            <a:srcRect/>
+            <a:stretch>
+              <a:fillRect/>
+            </a:stretch>
+          </p:blipFill>
+          <p:spPr bwMode="auto">
+            <a:xfrm>
+              <a:off x="7100059" y="2851463"/>
+              <a:ext cx="2103120" cy="2103120"/>
+            </a:xfrm>
+            <a:prstGeom prst="rect">
+              <a:avLst/>
+            </a:prstGeom>
+            <a:noFill/>
+            <a:extLst>
+              <a:ext uri="{909E8E84-426E-40DD-AFC4-6F175D3DCCD1}">
+                <a14:hiddenFill xmlns:a14="http://schemas.microsoft.com/office/drawing/2010/main">
+                  <a:solidFill>
+                    <a:srgbClr val="FFFFFF"/>
+                  </a:solidFill>
+                </a14:hiddenFill>
+              </a:ext>
+            </a:extLst>
+          </p:spPr>
+        </p:pic>
+      </p:grpSp>
     </p:spTree>
     <p:extLst>
       <p:ext uri="{BB962C8B-B14F-4D97-AF65-F5344CB8AC3E}">
@@ -6613,7 +7055,7 @@
                   <a:srgbClr val="FF0000"/>
                 </a:solidFill>
               </a:rPr>
-              <a:t>To earn the most </a:t>
+              <a:t>Please make sure to listen to each instruction carefully and </a:t>
             </a:r>
             <a:r>
               <a:rPr lang="en-US" b="1" dirty="0">
@@ -6621,7 +7063,7 @@
                   <a:srgbClr val="FF0000"/>
                 </a:solidFill>
               </a:rPr>
-              <a:t>bonus pay, </a:t>
+              <a:t>wait for the experimenter to instruct you</a:t>
             </a:r>
             <a:r>
               <a:rPr lang="en-US" dirty="0">
@@ -6629,15 +7071,33 @@
                   <a:srgbClr val="FF0000"/>
                 </a:solidFill>
               </a:rPr>
-              <a:t>make sure to listen to each instruction carefully and don’t be afraid to ask questions if you need clarification!</a:t>
-            </a:r>
-            <a:endParaRPr lang="en-US" dirty="0"/>
-          </a:p>
-        </p:txBody>
-      </p:sp>
-      <p:sp>
-        <p:nvSpPr>
-          <p:cNvPr id="4" name="TextBox 3"/>
+              <a:t> to proceed to the next instruction. </a:t>
+            </a:r>
+          </a:p>
+          <a:p>
+            <a:pPr marL="0" indent="0" algn="ctr">
+              <a:buNone/>
+            </a:pPr>
+            <a:r>
+              <a:rPr lang="en-US" b="1" dirty="0">
+                <a:solidFill>
+                  <a:schemeClr val="accent6"/>
+                </a:solidFill>
+              </a:rPr>
+              <a:t>Don’t be afraid to ask questions if you need clarification! </a:t>
+            </a:r>
+          </a:p>
+        </p:txBody>
+      </p:sp>
+      <p:sp>
+        <p:nvSpPr>
+          <p:cNvPr id="5" name="TextBox 4">
+            <a:extLst>
+              <a:ext uri="{FF2B5EF4-FFF2-40B4-BE49-F238E27FC236}">
+                <a16:creationId xmlns:a16="http://schemas.microsoft.com/office/drawing/2014/main" id="{80CFBE3F-ABD1-49DE-8A21-3409211CF6A4}"/>
+              </a:ext>
+            </a:extLst>
+          </p:cNvPr>
           <p:cNvSpPr txBox="1"/>
           <p:nvPr/>
         </p:nvSpPr>
@@ -6659,16 +7119,12 @@
           <a:p>
             <a:pPr algn="ctr"/>
             <a:r>
-              <a:rPr lang="en-US" sz="2400" b="1" dirty="0"/>
-              <a:t>Press Spacebar to continue </a:t>
-            </a:r>
-            <a:r>
-              <a:rPr lang="mr-IN" sz="2400" b="1" dirty="0"/>
-              <a:t>…</a:t>
-            </a:r>
-            <a:r>
-              <a:rPr lang="en-US" sz="2400" b="1" dirty="0"/>
-              <a:t> </a:t>
+              <a:rPr lang="en-US" sz="2400" b="1" dirty="0">
+                <a:solidFill>
+                  <a:schemeClr val="accent6"/>
+                </a:solidFill>
+              </a:rPr>
+              <a:t>Do you have any questions?</a:t>
             </a:r>
           </a:p>
         </p:txBody>
@@ -7857,16 +8313,12 @@
           <a:p>
             <a:pPr algn="ctr"/>
             <a:r>
-              <a:rPr lang="en-US" sz="2400" b="1" dirty="0"/>
-              <a:t>Press Spacebar to continue </a:t>
-            </a:r>
-            <a:r>
-              <a:rPr lang="mr-IN" sz="2400" b="1" dirty="0"/>
-              <a:t>…</a:t>
-            </a:r>
-            <a:r>
-              <a:rPr lang="en-US" sz="2400" b="1" dirty="0"/>
-              <a:t> </a:t>
+              <a:rPr lang="en-US" sz="2400" b="1" dirty="0">
+                <a:solidFill>
+                  <a:schemeClr val="accent6"/>
+                </a:solidFill>
+              </a:rPr>
+              <a:t>Do you have any questions?</a:t>
             </a:r>
           </a:p>
         </p:txBody>
@@ -7919,23 +8371,19 @@
         </p:nvSpPr>
         <p:spPr>
           <a:xfrm>
-            <a:off x="0" y="220374"/>
-            <a:ext cx="12192000" cy="942743"/>
+            <a:off x="0" y="107699"/>
+            <a:ext cx="12192000" cy="361517"/>
           </a:xfrm>
         </p:spPr>
         <p:txBody>
           <a:bodyPr>
-            <a:normAutofit/>
+            <a:normAutofit fontScale="90000"/>
           </a:bodyPr>
           <a:lstStyle/>
           <a:p>
             <a:r>
-              <a:rPr lang="en-US" b="1" dirty="0"/>
-              <a:t>Practice</a:t>
-            </a:r>
-            <a:r>
-              <a:rPr lang="en-US" dirty="0"/>
-              <a:t>: Exploring the Environment</a:t>
+              <a:rPr lang="en-US" sz="2400" b="1" dirty="0"/>
+              <a:t>Section 1: Practice</a:t>
             </a:r>
           </a:p>
         </p:txBody>
@@ -8136,15 +8584,27 @@
           <a:p>
             <a:pPr algn="ctr"/>
             <a:r>
-              <a:rPr lang="en-US" sz="2400" b="1" dirty="0"/>
+              <a:rPr lang="en-US" sz="2400" b="1" dirty="0">
+                <a:solidFill>
+                  <a:schemeClr val="accent6"/>
+                </a:solidFill>
+              </a:rPr>
               <a:t>Press Spacebar to continue </a:t>
             </a:r>
             <a:r>
-              <a:rPr lang="mr-IN" sz="2400" b="1" dirty="0"/>
+              <a:rPr lang="mr-IN" sz="2400" b="1" dirty="0">
+                <a:solidFill>
+                  <a:schemeClr val="accent6"/>
+                </a:solidFill>
+              </a:rPr>
               <a:t>…</a:t>
             </a:r>
             <a:r>
-              <a:rPr lang="en-US" sz="2400" b="1" dirty="0"/>
+              <a:rPr lang="en-US" sz="2400" b="1" dirty="0">
+                <a:solidFill>
+                  <a:schemeClr val="accent6"/>
+                </a:solidFill>
+              </a:rPr>
               <a:t> </a:t>
             </a:r>
           </a:p>
@@ -8371,7 +8831,7 @@
             <a:noFill/>
             <a:extLst>
               <a:ext uri="{909E8E84-426E-40dd-AFC4-6F175D3DCCD1}">
-                <a14:hiddenFill xmlns:a14="http://schemas.microsoft.com/office/drawing/2010/main" xmlns="">
+                <a14:hiddenFill xmlns="" xmlns:a14="http://schemas.microsoft.com/office/drawing/2010/main">
                   <a:solidFill>
                     <a:srgbClr val="FFFFFF"/>
                   </a:solidFill>
@@ -8614,16 +9074,47 @@
           <a:p>
             <a:pPr algn="ctr"/>
             <a:r>
+              <a:rPr lang="en-US" sz="2400" b="1" dirty="0">
+                <a:solidFill>
+                  <a:schemeClr val="accent6"/>
+                </a:solidFill>
+              </a:rPr>
+              <a:t>Do you have any questions?</a:t>
+            </a:r>
+          </a:p>
+        </p:txBody>
+      </p:sp>
+      <p:sp>
+        <p:nvSpPr>
+          <p:cNvPr id="16" name="Title 1">
+            <a:extLst>
+              <a:ext uri="{FF2B5EF4-FFF2-40B4-BE49-F238E27FC236}">
+                <a16:creationId xmlns:a16="http://schemas.microsoft.com/office/drawing/2014/main" id="{38D94F58-4C13-4EA1-A53F-8FFD75E497BD}"/>
+              </a:ext>
+            </a:extLst>
+          </p:cNvPr>
+          <p:cNvSpPr>
+            <a:spLocks noGrp="1"/>
+          </p:cNvSpPr>
+          <p:nvPr>
+            <p:ph type="ctrTitle"/>
+          </p:nvPr>
+        </p:nvSpPr>
+        <p:spPr>
+          <a:xfrm>
+            <a:off x="0" y="107699"/>
+            <a:ext cx="12192000" cy="361517"/>
+          </a:xfrm>
+        </p:spPr>
+        <p:txBody>
+          <a:bodyPr>
+            <a:normAutofit fontScale="90000"/>
+          </a:bodyPr>
+          <a:lstStyle/>
+          <a:p>
+            <a:r>
               <a:rPr lang="en-US" sz="2400" b="1" dirty="0"/>
-              <a:t>Press Spacebar to continue </a:t>
-            </a:r>
-            <a:r>
-              <a:rPr lang="mr-IN" sz="2400" b="1" dirty="0"/>
-              <a:t>…</a:t>
-            </a:r>
-            <a:r>
-              <a:rPr lang="en-US" sz="2400" b="1" dirty="0"/>
-              <a:t> </a:t>
+              <a:t>Section 1: Practice</a:t>
             </a:r>
           </a:p>
         </p:txBody>
@@ -8874,16 +9365,12 @@
           <a:p>
             <a:pPr algn="ctr"/>
             <a:r>
-              <a:rPr lang="en-US" sz="2400" b="1" dirty="0"/>
-              <a:t>Press Spacebar to continue </a:t>
-            </a:r>
-            <a:r>
-              <a:rPr lang="mr-IN" sz="2400" b="1" dirty="0"/>
-              <a:t>…</a:t>
-            </a:r>
-            <a:r>
-              <a:rPr lang="en-US" sz="2400" b="1" dirty="0"/>
-              <a:t> </a:t>
+              <a:rPr lang="en-US" sz="2400" b="1" dirty="0">
+                <a:solidFill>
+                  <a:schemeClr val="accent6"/>
+                </a:solidFill>
+              </a:rPr>
+              <a:t>Do you have any questions?</a:t>
             </a:r>
           </a:p>
         </p:txBody>
@@ -8932,6 +9419,61 @@
           </a:fontRef>
         </p:style>
       </p:cxnSp>
+      <p:sp>
+        <p:nvSpPr>
+          <p:cNvPr id="8" name="Title 1">
+            <a:extLst>
+              <a:ext uri="{FF2B5EF4-FFF2-40B4-BE49-F238E27FC236}">
+                <a16:creationId xmlns:a16="http://schemas.microsoft.com/office/drawing/2014/main" id="{06CDF321-4251-4516-96F9-B5C512296C4E}"/>
+              </a:ext>
+            </a:extLst>
+          </p:cNvPr>
+          <p:cNvSpPr txBox="1">
+            <a:spLocks/>
+          </p:cNvSpPr>
+          <p:nvPr/>
+        </p:nvSpPr>
+        <p:spPr>
+          <a:xfrm>
+            <a:off x="0" y="107699"/>
+            <a:ext cx="12192000" cy="361517"/>
+          </a:xfrm>
+          <a:prstGeom prst="rect">
+            <a:avLst/>
+          </a:prstGeom>
+        </p:spPr>
+        <p:txBody>
+          <a:bodyPr vert="horz" lIns="91440" tIns="45720" rIns="91440" bIns="45720" rtlCol="0" anchor="ctr">
+            <a:normAutofit fontScale="90000" lnSpcReduction="20000"/>
+          </a:bodyPr>
+          <a:lstStyle>
+            <a:lvl1pPr algn="l" defTabSz="914400" rtl="0" eaLnBrk="1" latinLnBrk="0" hangingPunct="1">
+              <a:lnSpc>
+                <a:spcPct val="90000"/>
+              </a:lnSpc>
+              <a:spcBef>
+                <a:spcPct val="0"/>
+              </a:spcBef>
+              <a:buNone/>
+              <a:defRPr sz="4400" kern="1200">
+                <a:solidFill>
+                  <a:schemeClr val="tx1"/>
+                </a:solidFill>
+                <a:latin typeface="+mj-lt"/>
+                <a:ea typeface="+mj-ea"/>
+                <a:cs typeface="+mj-cs"/>
+              </a:defRPr>
+            </a:lvl1pPr>
+          </a:lstStyle>
+          <a:p>
+            <a:pPr algn="ctr"/>
+            <a:r>
+              <a:rPr lang="en-US" sz="2400" b="1" dirty="0"/>
+              <a:t>Section 1: Practice</a:t>
+            </a:r>
+          </a:p>
+        </p:txBody>
+      </p:sp>
     </p:spTree>
     <p:extLst>
       <p:ext uri="{BB962C8B-B14F-4D97-AF65-F5344CB8AC3E}">
@@ -9131,7 +9673,7 @@
             <a:noFill/>
             <a:extLst>
               <a:ext uri="{909E8E84-426E-40dd-AFC4-6F175D3DCCD1}">
-                <a14:hiddenFill xmlns:a14="http://schemas.microsoft.com/office/drawing/2010/main" xmlns="">
+                <a14:hiddenFill xmlns="" xmlns:a14="http://schemas.microsoft.com/office/drawing/2010/main">
                   <a:solidFill>
                     <a:srgbClr val="FFFFFF"/>
                   </a:solidFill>
@@ -9176,7 +9718,7 @@
             <a:noFill/>
             <a:extLst>
               <a:ext uri="{909E8E84-426E-40dd-AFC4-6F175D3DCCD1}">
-                <a14:hiddenFill xmlns:a14="http://schemas.microsoft.com/office/drawing/2010/main" xmlns="">
+                <a14:hiddenFill xmlns="" xmlns:a14="http://schemas.microsoft.com/office/drawing/2010/main">
                   <a:solidFill>
                     <a:srgbClr val="FFFFFF"/>
                   </a:solidFill>
@@ -9221,7 +9763,7 @@
             <a:noFill/>
             <a:extLst>
               <a:ext uri="{909E8E84-426E-40dd-AFC4-6F175D3DCCD1}">
-                <a14:hiddenFill xmlns:a14="http://schemas.microsoft.com/office/drawing/2010/main" xmlns="">
+                <a14:hiddenFill xmlns="" xmlns:a14="http://schemas.microsoft.com/office/drawing/2010/main">
                   <a:solidFill>
                     <a:srgbClr val="FFFFFF"/>
                   </a:solidFill>
@@ -9549,8 +10091,8 @@
         </p:nvSpPr>
         <p:spPr>
           <a:xfrm>
-            <a:off x="3824624" y="5656542"/>
-            <a:ext cx="4782193" cy="461665"/>
+            <a:off x="2086484" y="4021706"/>
+            <a:ext cx="8019033" cy="461665"/>
           </a:xfrm>
           <a:prstGeom prst="rect">
             <a:avLst/>
@@ -9565,16 +10107,12 @@
           <a:p>
             <a:pPr algn="ctr"/>
             <a:r>
-              <a:rPr lang="en-US" sz="2400" b="1" dirty="0"/>
-              <a:t>Press Spacebar to continue </a:t>
-            </a:r>
-            <a:r>
-              <a:rPr lang="mr-IN" sz="2400" b="1" dirty="0"/>
-              <a:t>…</a:t>
-            </a:r>
-            <a:r>
-              <a:rPr lang="en-US" sz="2400" b="1" dirty="0"/>
-              <a:t> </a:t>
+              <a:rPr lang="en-US" sz="2400" b="1" dirty="0">
+                <a:solidFill>
+                  <a:schemeClr val="accent6"/>
+                </a:solidFill>
+              </a:rPr>
+              <a:t>Notify the Experimenter that you’ve completed this section</a:t>
             </a:r>
           </a:p>
         </p:txBody>

</xml_diff>